<commit_message>
modified:   CUNY_ComputerVision_CSC74030/DriverDistraction/DriverDistractionDetector.pptx 	deleted:    CUNY_ComputerVision_CSC74030/DriverDistraction/IMG_3259.mp4 	deleted:    CUNY_ComputerVision_CSC74030/DriverDistraction/IMG_3260.mp4 	deleted:    CUNY_ComputerVision_CSC74030/DriverDistraction/IMG_3261.mp4 	deleted:    CUNY_ComputerVision_CSC74030/DriverDistraction/detection.py 	modified:   CUNY_ComputerVision_CSC74030/DriverDistraction/driverDistraction.py 	modified:   CUNY_ComputerVision_CSC74030/DriverDistraction/drowse1.py 	deleted:    CUNY_ComputerVision_CSC74030/DriverDistraction/head_detection.py 	deleted:    CUNY_ComputerVision_CSC74030/DriverDistraction/pose_estimation.py 	modified:   CUNY_ComputerVision_CSC74030/DriverDistraction/test.py 	deleted:    CUNY_ComputerVision_CSC74030/DriverDistraction/utils.py 	deleted:    CUNY_ComputerVision_CSC74030/DriverDistraction/video.py
</commit_message>
<xml_diff>
--- a/CUNY_ComputerVision_CSC74030/DriverDistraction/DriverDistractionDetector.pptx
+++ b/CUNY_ComputerVision_CSC74030/DriverDistraction/DriverDistractionDetector.pptx
@@ -1932,15 +1932,7 @@
           <a:p>
             <a:r>
               <a:rPr lang="en-US" dirty="0"/>
-              <a:t>Here, I only discuss the drowsy and talking modules. </a:t>
-            </a:r>
-            <a:r>
-              <a:rPr lang="en-US" dirty="0" err="1"/>
-              <a:t>Nacy</a:t>
-            </a:r>
-            <a:r>
-              <a:rPr lang="en-US" dirty="0"/>
-              <a:t> will introduce the head pose module detail in her presentation. In drowsy and talking, the key is the distance between landmark points. When we falling sleep, the</a:t>
+              <a:t>In drowsy and talking, the key is the distance between landmark points. When we falling sleep, the</a:t>
             </a:r>
             <a:r>
               <a:rPr lang="zh-CN" altLang="en-US" dirty="0"/>
@@ -8299,8 +8291,8 @@
           </a:extLst>
         </p:spPr>
       </p:pic>
-      <mc:AlternateContent xmlns:mc="http://schemas.openxmlformats.org/markup-compatibility/2006">
-        <mc:Choice xmlns:a14="http://schemas.microsoft.com/office/drawing/2010/main" Requires="a14">
+      <mc:AlternateContent xmlns:mc="http://schemas.openxmlformats.org/markup-compatibility/2006" xmlns:a14="http://schemas.microsoft.com/office/drawing/2010/main">
+        <mc:Choice Requires="a14">
           <p:sp>
             <p:nvSpPr>
               <p:cNvPr id="7" name="TextBox 6">
@@ -8783,7 +8775,7 @@
             </p:txBody>
           </p:sp>
         </mc:Choice>
-        <mc:Fallback>
+        <mc:Fallback xmlns="">
           <p:sp>
             <p:nvSpPr>
               <p:cNvPr id="7" name="TextBox 6">
@@ -9271,12 +9263,49 @@
         </p:blipFill>
         <p:spPr>
           <a:xfrm>
-            <a:off x="5387351" y="2301756"/>
+            <a:off x="5387351" y="845387"/>
             <a:ext cx="6161183" cy="2264233"/>
           </a:xfrm>
           <a:prstGeom prst="rect">
             <a:avLst/>
           </a:prstGeom>
+        </p:spPr>
+      </p:pic>
+      <p:pic>
+        <p:nvPicPr>
+          <p:cNvPr id="4" name="Content Placeholder 4">
+            <a:extLst>
+              <a:ext uri="{FF2B5EF4-FFF2-40B4-BE49-F238E27FC236}">
+                <a16:creationId xmlns:a16="http://schemas.microsoft.com/office/drawing/2014/main" id="{1C22E740-B384-D342-82C0-DE507D587610}"/>
+              </a:ext>
+            </a:extLst>
+          </p:cNvPr>
+          <p:cNvPicPr>
+            <a:picLocks noChangeAspect="1"/>
+          </p:cNvPicPr>
+          <p:nvPr/>
+        </p:nvPicPr>
+        <p:blipFill>
+          <a:blip r:embed="rId4"/>
+          <a:stretch>
+            <a:fillRect/>
+          </a:stretch>
+        </p:blipFill>
+        <p:spPr>
+          <a:xfrm>
+            <a:off x="5350866" y="3421812"/>
+            <a:ext cx="6197668" cy="2881915"/>
+          </a:xfrm>
+          <a:prstGeom prst="rect">
+            <a:avLst/>
+          </a:prstGeom>
+          <a:effectLst>
+            <a:outerShdw blurRad="25400" dir="17880000">
+              <a:srgbClr val="000000">
+                <a:alpha val="46000"/>
+              </a:srgbClr>
+            </a:outerShdw>
+          </a:effectLst>
         </p:spPr>
       </p:pic>
     </p:spTree>
@@ -9418,10 +9447,16 @@
           <a:p>
             <a:pPr algn="l"/>
             <a:r>
-              <a:rPr lang="en-US" sz="4200" b="0" i="0" u="none" strike="noStrike"/>
-              <a:t>Perspective-n-Point</a:t>
-            </a:r>
-            <a:endParaRPr lang="en-US" sz="4200"/>
+              <a:rPr lang="en-US" sz="4200" dirty="0"/>
+              <a:t>Obtaining the </a:t>
+            </a:r>
+            <a:br>
+              <a:rPr lang="en-US" sz="4200" dirty="0"/>
+            </a:br>
+            <a:r>
+              <a:rPr lang="en-US" sz="4200" dirty="0"/>
+              <a:t>Euler Angles</a:t>
+            </a:r>
           </a:p>
         </p:txBody>
       </p:sp>
@@ -9490,19 +9525,17 @@
       </p:sp>
       <p:pic>
         <p:nvPicPr>
-          <p:cNvPr id="5" name="Content Placeholder 4">
+          <p:cNvPr id="7" name="Picture 6">
             <a:extLst>
               <a:ext uri="{FF2B5EF4-FFF2-40B4-BE49-F238E27FC236}">
-                <a16:creationId xmlns:a16="http://schemas.microsoft.com/office/drawing/2014/main" id="{7014E72F-2C4E-07B5-D557-EAD20C75A7EE}"/>
+                <a16:creationId xmlns:a16="http://schemas.microsoft.com/office/drawing/2014/main" id="{1BFA94BC-987C-447F-7D6E-3C3C47307CF6}"/>
               </a:ext>
             </a:extLst>
           </p:cNvPr>
           <p:cNvPicPr>
-            <a:picLocks noGrp="1" noChangeAspect="1"/>
+            <a:picLocks noChangeAspect="1"/>
           </p:cNvPicPr>
-          <p:nvPr>
-            <p:ph idx="1"/>
-          </p:nvPr>
+          <p:nvPr/>
         </p:nvPicPr>
         <p:blipFill>
           <a:blip r:embed="rId3"/>
@@ -9512,8 +9545,8 @@
         </p:blipFill>
         <p:spPr>
           <a:xfrm>
-            <a:off x="5324315" y="1988042"/>
-            <a:ext cx="6197668" cy="2881915"/>
+            <a:off x="4904363" y="2561362"/>
+            <a:ext cx="6825415" cy="1735275"/>
           </a:xfrm>
           <a:prstGeom prst="rect">
             <a:avLst/>
@@ -10356,12 +10389,12 @@
         <p:spPr>
           <a:xfrm>
             <a:off x="6900493" y="1732449"/>
-            <a:ext cx="4403596" cy="4058751"/>
+            <a:ext cx="4403596" cy="4515951"/>
           </a:xfrm>
         </p:spPr>
         <p:txBody>
           <a:bodyPr anchor="t">
-            <a:normAutofit/>
+            <a:normAutofit fontScale="85000" lnSpcReduction="20000"/>
           </a:bodyPr>
           <a:lstStyle/>
           <a:p>
@@ -10407,6 +10440,33 @@
             <a:r>
               <a:rPr lang="en-US" sz="2800" dirty="0"/>
               <a:t>Drowsy &amp; Talking</a:t>
+            </a:r>
+          </a:p>
+          <a:p>
+            <a:pPr marL="36900" lvl="0" indent="0">
+              <a:buNone/>
+            </a:pPr>
+            <a:r>
+              <a:rPr lang="en-US" sz="2800" dirty="0"/>
+              <a:t>Head Pose Estimation</a:t>
+            </a:r>
+          </a:p>
+          <a:p>
+            <a:pPr marL="36900" lvl="0" indent="0">
+              <a:buNone/>
+            </a:pPr>
+            <a:r>
+              <a:rPr lang="en-US" sz="2800" dirty="0"/>
+              <a:t>Perspective-n-Point</a:t>
+            </a:r>
+          </a:p>
+          <a:p>
+            <a:pPr marL="36900" lvl="0" indent="0">
+              <a:buNone/>
+            </a:pPr>
+            <a:r>
+              <a:rPr lang="en-US" sz="2800" dirty="0"/>
+              <a:t>Out of Road Distraction</a:t>
             </a:r>
           </a:p>
           <a:p>
@@ -11486,7 +11546,7 @@
         </p:blipFill>
         <p:spPr>
           <a:xfrm>
-            <a:off x="3895841" y="2547647"/>
+            <a:off x="4140539" y="2547647"/>
             <a:ext cx="1460754" cy="3043238"/>
           </a:xfrm>
         </p:spPr>
@@ -13815,6 +13875,36 @@
           </a:p>
         </p:txBody>
       </p:sp>
+      <p:pic>
+        <p:nvPicPr>
+          <p:cNvPr id="8" name="Picture 7">
+            <a:extLst>
+              <a:ext uri="{FF2B5EF4-FFF2-40B4-BE49-F238E27FC236}">
+                <a16:creationId xmlns:a16="http://schemas.microsoft.com/office/drawing/2014/main" id="{80E63872-757A-9927-69E6-5F8312F5986C}"/>
+              </a:ext>
+            </a:extLst>
+          </p:cNvPr>
+          <p:cNvPicPr>
+            <a:picLocks noChangeAspect="1"/>
+          </p:cNvPicPr>
+          <p:nvPr/>
+        </p:nvPicPr>
+        <p:blipFill>
+          <a:blip r:embed="rId5"/>
+          <a:stretch>
+            <a:fillRect/>
+          </a:stretch>
+        </p:blipFill>
+        <p:spPr>
+          <a:xfrm>
+            <a:off x="1189053" y="3792409"/>
+            <a:ext cx="2395936" cy="1798476"/>
+          </a:xfrm>
+          <a:prstGeom prst="rect">
+            <a:avLst/>
+          </a:prstGeom>
+        </p:spPr>
+      </p:pic>
     </p:spTree>
     <p:extLst>
       <p:ext uri="{BB962C8B-B14F-4D97-AF65-F5344CB8AC3E}">
@@ -15387,8 +15477,8 @@
           </a:extLst>
         </p:spPr>
       </p:pic>
-      <mc:AlternateContent xmlns:mc="http://schemas.openxmlformats.org/markup-compatibility/2006">
-        <mc:Choice xmlns:a14="http://schemas.microsoft.com/office/drawing/2010/main" Requires="a14">
+      <mc:AlternateContent xmlns:mc="http://schemas.openxmlformats.org/markup-compatibility/2006" xmlns:a14="http://schemas.microsoft.com/office/drawing/2010/main">
+        <mc:Choice Requires="a14">
           <p:sp>
             <p:nvSpPr>
               <p:cNvPr id="9" name="TextBox 8">
@@ -15815,7 +15905,7 @@
             </p:txBody>
           </p:sp>
         </mc:Choice>
-        <mc:Fallback>
+        <mc:Fallback xmlns="">
           <p:sp>
             <p:nvSpPr>
               <p:cNvPr id="9" name="TextBox 8">
@@ -16484,15 +16574,6 @@
 </file>
 
 <file path=customXml/item1.xml><?xml version="1.0" encoding="utf-8"?>
-<?mso-contentType ?>
-<FormTemplates xmlns="http://schemas.microsoft.com/sharepoint/v3/contenttype/forms">
-  <Display>DocumentLibraryForm</Display>
-  <Edit>DocumentLibraryForm</Edit>
-  <New>DocumentLibraryForm</New>
-</FormTemplates>
-</file>
-
-<file path=customXml/item2.xml><?xml version="1.0" encoding="utf-8"?>
 <ct:contentTypeSchema xmlns:ct="http://schemas.microsoft.com/office/2006/metadata/contentType" xmlns:ma="http://schemas.microsoft.com/office/2006/metadata/properties/metaAttributes" ct:_="" ma:_="" ma:contentTypeName="Document" ma:contentTypeID="0x01010079F111ED35F8CC479449609E8A0923A6" ma:contentTypeVersion="12" ma:contentTypeDescription="Create a new document." ma:contentTypeScope="" ma:versionID="a410dd7f93c95333ffa1b60ed6adedd1">
   <xsd:schema xmlns:xsd="http://www.w3.org/2001/XMLSchema" xmlns:xs="http://www.w3.org/2001/XMLSchema" xmlns:p="http://schemas.microsoft.com/office/2006/metadata/properties" xmlns:ns2="71af3243-3dd4-4a8d-8c0d-dd76da1f02a5" xmlns:ns3="16c05727-aa75-4e4a-9b5f-8a80a1165891" targetNamespace="http://schemas.microsoft.com/office/2006/metadata/properties" ma:root="true" ma:fieldsID="a936d9baba76aa3866493feff160faab" ns2:_="" ns3:_="">
     <xsd:import namespace="71af3243-3dd4-4a8d-8c0d-dd76da1f02a5"/>
@@ -16713,7 +16794,7 @@
 </ct:contentTypeSchema>
 </file>
 
-<file path=customXml/item3.xml><?xml version="1.0" encoding="utf-8"?>
+<file path=customXml/item2.xml><?xml version="1.0" encoding="utf-8"?>
 <p:properties xmlns:p="http://schemas.microsoft.com/office/2006/metadata/properties" xmlns:xsi="http://www.w3.org/2001/XMLSchema-instance" xmlns:pc="http://schemas.microsoft.com/office/infopath/2007/PartnerControls">
   <documentManagement>
     <Status xmlns="71af3243-3dd4-4a8d-8c0d-dd76da1f02a5">Not started</Status>
@@ -16722,23 +16803,25 @@
 </p:properties>
 </file>
 
-<file path=customXml/itemProps1.xml><?xml version="1.0" encoding="utf-8"?>
-<ds:datastoreItem xmlns:ds="http://schemas.openxmlformats.org/officeDocument/2006/customXml" ds:itemID="{64B270AB-C138-415C-897E-3C24487DECF1}">
-  <ds:schemaRefs>
-    <ds:schemaRef ds:uri="http://schemas.microsoft.com/sharepoint/v3/contenttype/forms"/>
-  </ds:schemaRefs>
-</ds:datastoreItem>
+<file path=customXml/item3.xml><?xml version="1.0" encoding="utf-8"?>
+<?mso-contentType ?>
+<FormTemplates xmlns="http://schemas.microsoft.com/sharepoint/v3/contenttype/forms">
+  <Display>DocumentLibraryForm</Display>
+  <Edit>DocumentLibraryForm</Edit>
+  <New>DocumentLibraryForm</New>
+</FormTemplates>
 </file>
 
-<file path=customXml/itemProps2.xml><?xml version="1.0" encoding="utf-8"?>
+<file path=customXml/itemProps1.xml><?xml version="1.0" encoding="utf-8"?>
 <ds:datastoreItem xmlns:ds="http://schemas.openxmlformats.org/officeDocument/2006/customXml" ds:itemID="{0585E981-8C91-4205-A0C3-C991F42B4C9E}">
   <ds:schemaRefs>
     <ds:schemaRef ds:uri="http://schemas.microsoft.com/office/2006/metadata/contentType"/>
     <ds:schemaRef ds:uri="http://schemas.microsoft.com/office/2006/metadata/properties/metaAttributes"/>
+    <ds:schemaRef ds:uri="http://www.w3.org/2000/xmlns/"/>
     <ds:schemaRef ds:uri="http://www.w3.org/2001/XMLSchema"/>
-    <ds:schemaRef ds:uri="http://schemas.microsoft.com/office/2006/metadata/properties"/>
     <ds:schemaRef ds:uri="71af3243-3dd4-4a8d-8c0d-dd76da1f02a5"/>
     <ds:schemaRef ds:uri="16c05727-aa75-4e4a-9b5f-8a80a1165891"/>
+    <ds:schemaRef ds:uri="http://schemas.microsoft.com/office/2006/metadata/properties"/>
     <ds:schemaRef ds:uri="http://schemas.microsoft.com/office/2006/documentManagement/types"/>
     <ds:schemaRef ds:uri="http://schemas.microsoft.com/office/infopath/2007/PartnerControls"/>
     <ds:schemaRef ds:uri="http://schemas.openxmlformats.org/package/2006/metadata/core-properties"/>
@@ -16749,12 +16832,22 @@
 </ds:datastoreItem>
 </file>
 
-<file path=customXml/itemProps3.xml><?xml version="1.0" encoding="utf-8"?>
+<file path=customXml/itemProps2.xml><?xml version="1.0" encoding="utf-8"?>
 <ds:datastoreItem xmlns:ds="http://schemas.openxmlformats.org/officeDocument/2006/customXml" ds:itemID="{2C4C00F4-06E9-43E3-AD97-88A857CEFA82}">
   <ds:schemaRefs>
     <ds:schemaRef ds:uri="http://schemas.microsoft.com/office/2006/metadata/properties"/>
+    <ds:schemaRef ds:uri="http://www.w3.org/2000/xmlns/"/>
+    <ds:schemaRef ds:uri="71af3243-3dd4-4a8d-8c0d-dd76da1f02a5"/>
+    <ds:schemaRef ds:uri="http://www.w3.org/2001/XMLSchema-instance"/>
     <ds:schemaRef ds:uri="http://schemas.microsoft.com/office/infopath/2007/PartnerControls"/>
-    <ds:schemaRef ds:uri="71af3243-3dd4-4a8d-8c0d-dd76da1f02a5"/>
+  </ds:schemaRefs>
+</ds:datastoreItem>
+</file>
+
+<file path=customXml/itemProps3.xml><?xml version="1.0" encoding="utf-8"?>
+<ds:datastoreItem xmlns:ds="http://schemas.openxmlformats.org/officeDocument/2006/customXml" ds:itemID="{64B270AB-C138-415C-897E-3C24487DECF1}">
+  <ds:schemaRefs>
+    <ds:schemaRef ds:uri="http://schemas.microsoft.com/sharepoint/v3/contenttype/forms"/>
   </ds:schemaRefs>
 </ds:datastoreItem>
 </file>
</xml_diff>